<commit_message>
Chap02: correction Herve done until SFD
</commit_message>
<xml_diff>
--- a/02-GrowthQDs/Pictures/ChargeContSample.pptx
+++ b/02-GrowthQDs/Pictures/ChargeContSample.pptx
@@ -7,7 +7,7 @@
   <p:sldIdLst>
     <p:sldId id="256" r:id="rId2"/>
   </p:sldIdLst>
-  <p:sldSz cx="3744913" cy="2016125"/>
+  <p:sldSz cx="3744913" cy="2124075"/>
   <p:notesSz cx="6858000" cy="9144000"/>
   <p:defaultTextStyle>
     <a:defPPr>
@@ -136,8 +136,8 @@
         </p:nvSpPr>
         <p:spPr>
           <a:xfrm>
-            <a:off x="280870" y="626307"/>
-            <a:ext cx="3183177" cy="432160"/>
+            <a:off x="280871" y="659842"/>
+            <a:ext cx="3183177" cy="455299"/>
           </a:xfrm>
         </p:spPr>
         <p:txBody>
@@ -164,8 +164,8 @@
         </p:nvSpPr>
         <p:spPr>
           <a:xfrm>
-            <a:off x="561738" y="1142472"/>
-            <a:ext cx="2621439" cy="515232"/>
+            <a:off x="561739" y="1203644"/>
+            <a:ext cx="2621439" cy="542819"/>
           </a:xfrm>
         </p:spPr>
         <p:txBody>
@@ -288,7 +288,7 @@
           <a:p>
             <a:fld id="{275C29BF-30DA-4EEB-B4C9-02D07A7BBEAA}" type="datetimeFigureOut">
               <a:rPr lang="fr-FR" smtClean="0"/>
-              <a:t>13/09/2017</a:t>
+              <a:t>12/10/2017</a:t>
             </a:fld>
             <a:endParaRPr lang="fr-FR"/>
           </a:p>
@@ -458,7 +458,7 @@
           <a:p>
             <a:fld id="{275C29BF-30DA-4EEB-B4C9-02D07A7BBEAA}" type="datetimeFigureOut">
               <a:rPr lang="fr-FR" smtClean="0"/>
-              <a:t>13/09/2017</a:t>
+              <a:t>12/10/2017</a:t>
             </a:fld>
             <a:endParaRPr lang="fr-FR"/>
           </a:p>
@@ -548,8 +548,8 @@
         </p:nvSpPr>
         <p:spPr>
           <a:xfrm>
-            <a:off x="2715063" y="80739"/>
-            <a:ext cx="842605" cy="1720240"/>
+            <a:off x="2715064" y="85062"/>
+            <a:ext cx="842605" cy="1812347"/>
           </a:xfrm>
         </p:spPr>
         <p:txBody>
@@ -576,8 +576,8 @@
         </p:nvSpPr>
         <p:spPr>
           <a:xfrm>
-            <a:off x="187248" y="80739"/>
-            <a:ext cx="2465401" cy="1720240"/>
+            <a:off x="187249" y="85062"/>
+            <a:ext cx="2465401" cy="1812347"/>
           </a:xfrm>
         </p:spPr>
         <p:txBody>
@@ -638,7 +638,7 @@
           <a:p>
             <a:fld id="{275C29BF-30DA-4EEB-B4C9-02D07A7BBEAA}" type="datetimeFigureOut">
               <a:rPr lang="fr-FR" smtClean="0"/>
-              <a:t>13/09/2017</a:t>
+              <a:t>12/10/2017</a:t>
             </a:fld>
             <a:endParaRPr lang="fr-FR"/>
           </a:p>
@@ -808,7 +808,7 @@
           <a:p>
             <a:fld id="{275C29BF-30DA-4EEB-B4C9-02D07A7BBEAA}" type="datetimeFigureOut">
               <a:rPr lang="fr-FR" smtClean="0"/>
-              <a:t>13/09/2017</a:t>
+              <a:t>12/10/2017</a:t>
             </a:fld>
             <a:endParaRPr lang="fr-FR"/>
           </a:p>
@@ -898,8 +898,8 @@
         </p:nvSpPr>
         <p:spPr>
           <a:xfrm>
-            <a:off x="295824" y="1295549"/>
-            <a:ext cx="3183177" cy="400425"/>
+            <a:off x="295824" y="1364918"/>
+            <a:ext cx="3183177" cy="421865"/>
           </a:xfrm>
         </p:spPr>
         <p:txBody>
@@ -930,8 +930,8 @@
         </p:nvSpPr>
         <p:spPr>
           <a:xfrm>
-            <a:off x="295824" y="854521"/>
-            <a:ext cx="3183177" cy="441027"/>
+            <a:off x="295824" y="900275"/>
+            <a:ext cx="3183177" cy="464641"/>
           </a:xfrm>
         </p:spPr>
         <p:txBody>
@@ -1054,7 +1054,7 @@
           <a:p>
             <a:fld id="{275C29BF-30DA-4EEB-B4C9-02D07A7BBEAA}" type="datetimeFigureOut">
               <a:rPr lang="fr-FR" smtClean="0"/>
-              <a:t>13/09/2017</a:t>
+              <a:t>12/10/2017</a:t>
             </a:fld>
             <a:endParaRPr lang="fr-FR"/>
           </a:p>
@@ -1167,8 +1167,8 @@
         </p:nvSpPr>
         <p:spPr>
           <a:xfrm>
-            <a:off x="187248" y="470431"/>
-            <a:ext cx="1654004" cy="1330549"/>
+            <a:off x="187248" y="495620"/>
+            <a:ext cx="1654004" cy="1401791"/>
           </a:xfrm>
         </p:spPr>
         <p:txBody>
@@ -1252,8 +1252,8 @@
         </p:nvSpPr>
         <p:spPr>
           <a:xfrm>
-            <a:off x="1903666" y="470431"/>
-            <a:ext cx="1654004" cy="1330549"/>
+            <a:off x="1903666" y="495620"/>
+            <a:ext cx="1654004" cy="1401791"/>
           </a:xfrm>
         </p:spPr>
         <p:txBody>
@@ -1342,7 +1342,7 @@
           <a:p>
             <a:fld id="{275C29BF-30DA-4EEB-B4C9-02D07A7BBEAA}" type="datetimeFigureOut">
               <a:rPr lang="fr-FR" smtClean="0"/>
-              <a:t>13/09/2017</a:t>
+              <a:t>12/10/2017</a:t>
             </a:fld>
             <a:endParaRPr lang="fr-FR"/>
           </a:p>
@@ -1459,8 +1459,8 @@
         </p:nvSpPr>
         <p:spPr>
           <a:xfrm>
-            <a:off x="187248" y="451295"/>
-            <a:ext cx="1654654" cy="188078"/>
+            <a:off x="187248" y="475459"/>
+            <a:ext cx="1654654" cy="198148"/>
           </a:xfrm>
         </p:spPr>
         <p:txBody>
@@ -1524,8 +1524,8 @@
         </p:nvSpPr>
         <p:spPr>
           <a:xfrm>
-            <a:off x="187248" y="639373"/>
-            <a:ext cx="1654654" cy="1161606"/>
+            <a:off x="187248" y="673607"/>
+            <a:ext cx="1654654" cy="1223802"/>
           </a:xfrm>
         </p:spPr>
         <p:txBody>
@@ -1609,8 +1609,8 @@
         </p:nvSpPr>
         <p:spPr>
           <a:xfrm>
-            <a:off x="1902365" y="451295"/>
-            <a:ext cx="1655303" cy="188078"/>
+            <a:off x="1902366" y="475459"/>
+            <a:ext cx="1655303" cy="198148"/>
           </a:xfrm>
         </p:spPr>
         <p:txBody>
@@ -1674,8 +1674,8 @@
         </p:nvSpPr>
         <p:spPr>
           <a:xfrm>
-            <a:off x="1902365" y="639373"/>
-            <a:ext cx="1655303" cy="1161606"/>
+            <a:off x="1902366" y="673607"/>
+            <a:ext cx="1655303" cy="1223802"/>
           </a:xfrm>
         </p:spPr>
         <p:txBody>
@@ -1764,7 +1764,7 @@
           <a:p>
             <a:fld id="{275C29BF-30DA-4EEB-B4C9-02D07A7BBEAA}" type="datetimeFigureOut">
               <a:rPr lang="fr-FR" smtClean="0"/>
-              <a:t>13/09/2017</a:t>
+              <a:t>12/10/2017</a:t>
             </a:fld>
             <a:endParaRPr lang="fr-FR"/>
           </a:p>
@@ -1882,7 +1882,7 @@
           <a:p>
             <a:fld id="{275C29BF-30DA-4EEB-B4C9-02D07A7BBEAA}" type="datetimeFigureOut">
               <a:rPr lang="fr-FR" smtClean="0"/>
-              <a:t>13/09/2017</a:t>
+              <a:t>12/10/2017</a:t>
             </a:fld>
             <a:endParaRPr lang="fr-FR"/>
           </a:p>
@@ -1977,7 +1977,7 @@
           <a:p>
             <a:fld id="{275C29BF-30DA-4EEB-B4C9-02D07A7BBEAA}" type="datetimeFigureOut">
               <a:rPr lang="fr-FR" smtClean="0"/>
-              <a:t>13/09/2017</a:t>
+              <a:t>12/10/2017</a:t>
             </a:fld>
             <a:endParaRPr lang="fr-FR"/>
           </a:p>
@@ -2067,8 +2067,8 @@
         </p:nvSpPr>
         <p:spPr>
           <a:xfrm>
-            <a:off x="187247" y="80273"/>
-            <a:ext cx="1232051" cy="341622"/>
+            <a:off x="187248" y="84571"/>
+            <a:ext cx="1232051" cy="359914"/>
           </a:xfrm>
         </p:spPr>
         <p:txBody>
@@ -2099,8 +2099,8 @@
         </p:nvSpPr>
         <p:spPr>
           <a:xfrm>
-            <a:off x="1464159" y="80274"/>
-            <a:ext cx="2093511" cy="1720706"/>
+            <a:off x="1464160" y="84572"/>
+            <a:ext cx="2093511" cy="1812838"/>
           </a:xfrm>
         </p:spPr>
         <p:txBody>
@@ -2184,8 +2184,8 @@
         </p:nvSpPr>
         <p:spPr>
           <a:xfrm>
-            <a:off x="187247" y="421893"/>
-            <a:ext cx="1232051" cy="1379086"/>
+            <a:off x="187248" y="444482"/>
+            <a:ext cx="1232051" cy="1452927"/>
           </a:xfrm>
         </p:spPr>
         <p:txBody>
@@ -2254,7 +2254,7 @@
           <a:p>
             <a:fld id="{275C29BF-30DA-4EEB-B4C9-02D07A7BBEAA}" type="datetimeFigureOut">
               <a:rPr lang="fr-FR" smtClean="0"/>
-              <a:t>13/09/2017</a:t>
+              <a:t>12/10/2017</a:t>
             </a:fld>
             <a:endParaRPr lang="fr-FR"/>
           </a:p>
@@ -2344,8 +2344,8 @@
         </p:nvSpPr>
         <p:spPr>
           <a:xfrm>
-            <a:off x="734029" y="1411289"/>
-            <a:ext cx="2246948" cy="166610"/>
+            <a:off x="734029" y="1486854"/>
+            <a:ext cx="2246948" cy="175531"/>
           </a:xfrm>
         </p:spPr>
         <p:txBody>
@@ -2376,8 +2376,8 @@
         </p:nvSpPr>
         <p:spPr>
           <a:xfrm>
-            <a:off x="734029" y="180147"/>
-            <a:ext cx="2246948" cy="1209675"/>
+            <a:off x="734029" y="189793"/>
+            <a:ext cx="2246948" cy="1274445"/>
           </a:xfrm>
         </p:spPr>
         <p:txBody>
@@ -2437,8 +2437,8 @@
         </p:nvSpPr>
         <p:spPr>
           <a:xfrm>
-            <a:off x="734029" y="1577899"/>
-            <a:ext cx="2246948" cy="236615"/>
+            <a:off x="734029" y="1662386"/>
+            <a:ext cx="2246948" cy="249284"/>
           </a:xfrm>
         </p:spPr>
         <p:txBody>
@@ -2507,7 +2507,7 @@
           <a:p>
             <a:fld id="{275C29BF-30DA-4EEB-B4C9-02D07A7BBEAA}" type="datetimeFigureOut">
               <a:rPr lang="fr-FR" smtClean="0"/>
-              <a:t>13/09/2017</a:t>
+              <a:t>12/10/2017</a:t>
             </a:fld>
             <a:endParaRPr lang="fr-FR"/>
           </a:p>
@@ -2602,8 +2602,8 @@
         </p:nvSpPr>
         <p:spPr>
           <a:xfrm>
-            <a:off x="187247" y="80741"/>
-            <a:ext cx="3370422" cy="336021"/>
+            <a:off x="187247" y="85065"/>
+            <a:ext cx="3370422" cy="354013"/>
           </a:xfrm>
           <a:prstGeom prst="rect">
             <a:avLst/>
@@ -2635,8 +2635,8 @@
         </p:nvSpPr>
         <p:spPr>
           <a:xfrm>
-            <a:off x="187247" y="470431"/>
-            <a:ext cx="3370422" cy="1330549"/>
+            <a:off x="187247" y="495620"/>
+            <a:ext cx="3370422" cy="1401791"/>
           </a:xfrm>
           <a:prstGeom prst="rect">
             <a:avLst/>
@@ -2697,8 +2697,8 @@
         </p:nvSpPr>
         <p:spPr>
           <a:xfrm>
-            <a:off x="187246" y="1868650"/>
-            <a:ext cx="873814" cy="107340"/>
+            <a:off x="187246" y="1968704"/>
+            <a:ext cx="873814" cy="113087"/>
           </a:xfrm>
           <a:prstGeom prst="rect">
             <a:avLst/>
@@ -2720,7 +2720,7 @@
           <a:p>
             <a:fld id="{275C29BF-30DA-4EEB-B4C9-02D07A7BBEAA}" type="datetimeFigureOut">
               <a:rPr lang="fr-FR" smtClean="0"/>
-              <a:t>13/09/2017</a:t>
+              <a:t>12/10/2017</a:t>
             </a:fld>
             <a:endParaRPr lang="fr-FR"/>
           </a:p>
@@ -2738,8 +2738,8 @@
         </p:nvSpPr>
         <p:spPr>
           <a:xfrm>
-            <a:off x="1279514" y="1868650"/>
-            <a:ext cx="1185889" cy="107340"/>
+            <a:off x="1279515" y="1968704"/>
+            <a:ext cx="1185889" cy="113087"/>
           </a:xfrm>
           <a:prstGeom prst="rect">
             <a:avLst/>
@@ -2775,8 +2775,8 @@
         </p:nvSpPr>
         <p:spPr>
           <a:xfrm>
-            <a:off x="2683855" y="1868650"/>
-            <a:ext cx="873814" cy="107340"/>
+            <a:off x="2683855" y="1968704"/>
+            <a:ext cx="873814" cy="113087"/>
           </a:xfrm>
           <a:prstGeom prst="rect">
             <a:avLst/>
@@ -3097,30 +3097,28 @@
       </p:grpSpPr>
       <p:grpSp>
         <p:nvGrpSpPr>
-          <p:cNvPr id="134" name="Groupe 133"/>
-          <p:cNvGrpSpPr>
-            <a:grpSpLocks noChangeAspect="1"/>
-          </p:cNvGrpSpPr>
+          <p:cNvPr id="34" name="Groupe 33"/>
+          <p:cNvGrpSpPr/>
           <p:nvPr/>
         </p:nvGrpSpPr>
         <p:grpSpPr>
           <a:xfrm>
-            <a:off x="-73617" y="30641"/>
-            <a:ext cx="3781992" cy="1931782"/>
-            <a:chOff x="5072261" y="4725144"/>
-            <a:chExt cx="3870259" cy="2016224"/>
+            <a:off x="-73617" y="8835"/>
+            <a:ext cx="3781992" cy="2079347"/>
+            <a:chOff x="-73617" y="-116924"/>
+            <a:chExt cx="3781992" cy="2079347"/>
           </a:xfrm>
         </p:grpSpPr>
         <p:sp>
           <p:nvSpPr>
-            <p:cNvPr id="135" name="Rectangle 134"/>
+            <p:cNvPr id="35" name="Rectangle 34"/>
             <p:cNvSpPr/>
             <p:nvPr/>
           </p:nvSpPr>
           <p:spPr>
             <a:xfrm>
-              <a:off x="5846176" y="5877272"/>
-              <a:ext cx="2232248" cy="441920"/>
+              <a:off x="682648" y="1134516"/>
+              <a:ext cx="2181338" cy="423412"/>
             </a:xfrm>
             <a:prstGeom prst="rect">
               <a:avLst/>
@@ -3159,14 +3157,14 @@
         </p:sp>
         <p:sp>
           <p:nvSpPr>
-            <p:cNvPr id="136" name="Rectangle 135"/>
+            <p:cNvPr id="36" name="Rectangle 35"/>
             <p:cNvSpPr/>
             <p:nvPr/>
           </p:nvSpPr>
           <p:spPr>
             <a:xfrm>
-              <a:off x="5846176" y="5615529"/>
-              <a:ext cx="2232248" cy="45719"/>
+              <a:off x="682648" y="811728"/>
+              <a:ext cx="2181338" cy="43804"/>
             </a:xfrm>
             <a:prstGeom prst="rect">
               <a:avLst/>
@@ -3205,14 +3203,14 @@
         </p:sp>
         <p:sp>
           <p:nvSpPr>
-            <p:cNvPr id="137" name="Ellipse 136"/>
+            <p:cNvPr id="37" name="Ellipse 36"/>
             <p:cNvSpPr/>
             <p:nvPr/>
           </p:nvSpPr>
           <p:spPr>
             <a:xfrm>
-              <a:off x="5950692" y="5517232"/>
-              <a:ext cx="216024" cy="144016"/>
+              <a:off x="784780" y="717547"/>
+              <a:ext cx="211097" cy="137984"/>
             </a:xfrm>
             <a:prstGeom prst="ellipse">
               <a:avLst/>
@@ -3251,14 +3249,14 @@
         </p:sp>
         <p:sp>
           <p:nvSpPr>
-            <p:cNvPr id="138" name="Ellipse 137"/>
+            <p:cNvPr id="38" name="Ellipse 37"/>
             <p:cNvSpPr/>
             <p:nvPr/>
           </p:nvSpPr>
           <p:spPr>
             <a:xfrm>
-              <a:off x="6350232" y="5517232"/>
-              <a:ext cx="216024" cy="144016"/>
+              <a:off x="1175208" y="717547"/>
+              <a:ext cx="211097" cy="137984"/>
             </a:xfrm>
             <a:prstGeom prst="ellipse">
               <a:avLst/>
@@ -3297,14 +3295,14 @@
         </p:sp>
         <p:sp>
           <p:nvSpPr>
-            <p:cNvPr id="139" name="Ellipse 138"/>
+            <p:cNvPr id="39" name="Ellipse 38"/>
             <p:cNvSpPr/>
             <p:nvPr/>
           </p:nvSpPr>
           <p:spPr>
             <a:xfrm>
-              <a:off x="6638264" y="5517232"/>
-              <a:ext cx="216024" cy="144016"/>
+              <a:off x="1456671" y="717547"/>
+              <a:ext cx="211097" cy="137984"/>
             </a:xfrm>
             <a:prstGeom prst="ellipse">
               <a:avLst/>
@@ -3343,14 +3341,14 @@
         </p:sp>
         <p:sp>
           <p:nvSpPr>
-            <p:cNvPr id="140" name="Ellipse 139"/>
+            <p:cNvPr id="40" name="Ellipse 39"/>
             <p:cNvSpPr/>
             <p:nvPr/>
           </p:nvSpPr>
           <p:spPr>
             <a:xfrm>
-              <a:off x="7214328" y="5517232"/>
-              <a:ext cx="216024" cy="144016"/>
+              <a:off x="2019597" y="717547"/>
+              <a:ext cx="211097" cy="137984"/>
             </a:xfrm>
             <a:prstGeom prst="ellipse">
               <a:avLst/>
@@ -3389,14 +3387,14 @@
         </p:sp>
         <p:sp>
           <p:nvSpPr>
-            <p:cNvPr id="141" name="Ellipse 140"/>
+            <p:cNvPr id="41" name="Ellipse 40"/>
             <p:cNvSpPr/>
             <p:nvPr/>
           </p:nvSpPr>
           <p:spPr>
             <a:xfrm>
-              <a:off x="7790392" y="5517232"/>
-              <a:ext cx="216024" cy="144016"/>
+              <a:off x="2582523" y="717547"/>
+              <a:ext cx="211097" cy="137984"/>
             </a:xfrm>
             <a:prstGeom prst="ellipse">
               <a:avLst/>
@@ -3435,14 +3433,14 @@
         </p:sp>
         <p:sp>
           <p:nvSpPr>
-            <p:cNvPr id="142" name="Rectangle 141"/>
+            <p:cNvPr id="42" name="Rectangle 41"/>
             <p:cNvSpPr/>
             <p:nvPr/>
           </p:nvSpPr>
           <p:spPr>
             <a:xfrm>
-              <a:off x="5846176" y="5327497"/>
-              <a:ext cx="2232248" cy="45719"/>
+              <a:off x="682648" y="460202"/>
+              <a:ext cx="2181338" cy="43804"/>
             </a:xfrm>
             <a:prstGeom prst="rect">
               <a:avLst/>
@@ -3481,14 +3479,16 @@
         </p:sp>
         <p:cxnSp>
           <p:nvCxnSpPr>
-            <p:cNvPr id="143" name="Connecteur droit 142"/>
-            <p:cNvCxnSpPr/>
+            <p:cNvPr id="43" name="Connecteur droit 42"/>
+            <p:cNvCxnSpPr>
+              <a:endCxn id="42" idx="1"/>
+            </p:cNvCxnSpPr>
             <p:nvPr/>
           </p:nvCxnSpPr>
           <p:spPr>
             <a:xfrm flipV="1">
-              <a:off x="5835948" y="5374170"/>
-              <a:ext cx="10228" cy="945022"/>
+              <a:off x="672653" y="482104"/>
+              <a:ext cx="9995" cy="1075825"/>
             </a:xfrm>
             <a:prstGeom prst="line">
               <a:avLst/>
@@ -3511,14 +3511,16 @@
         </p:cxnSp>
         <p:cxnSp>
           <p:nvCxnSpPr>
-            <p:cNvPr id="144" name="Connecteur droit 143"/>
-            <p:cNvCxnSpPr/>
+            <p:cNvPr id="44" name="Connecteur droit 43"/>
+            <p:cNvCxnSpPr>
+              <a:endCxn id="42" idx="3"/>
+            </p:cNvCxnSpPr>
             <p:nvPr/>
           </p:nvCxnSpPr>
           <p:spPr>
-            <a:xfrm flipV="1">
-              <a:off x="8078425" y="5371313"/>
-              <a:ext cx="0" cy="947879"/>
+            <a:xfrm flipH="1" flipV="1">
+              <a:off x="2863986" y="482104"/>
+              <a:ext cx="1" cy="1075826"/>
             </a:xfrm>
             <a:prstGeom prst="line">
               <a:avLst/>
@@ -3541,14 +3543,14 @@
         </p:cxnSp>
         <p:cxnSp>
           <p:nvCxnSpPr>
-            <p:cNvPr id="145" name="Connecteur droit 144"/>
+            <p:cNvPr id="45" name="Connecteur droit 44"/>
             <p:cNvCxnSpPr/>
             <p:nvPr/>
           </p:nvCxnSpPr>
           <p:spPr>
             <a:xfrm>
-              <a:off x="5846176" y="5373216"/>
-              <a:ext cx="2232248" cy="0"/>
+              <a:off x="682648" y="504006"/>
+              <a:ext cx="2181338" cy="0"/>
             </a:xfrm>
             <a:prstGeom prst="line">
               <a:avLst/>
@@ -3571,14 +3573,14 @@
         </p:cxnSp>
         <p:sp>
           <p:nvSpPr>
-            <p:cNvPr id="146" name="Rectangle 145"/>
+            <p:cNvPr id="46" name="Rectangle 45"/>
             <p:cNvSpPr/>
             <p:nvPr/>
           </p:nvSpPr>
           <p:spPr>
             <a:xfrm>
-              <a:off x="5797132" y="5982272"/>
-              <a:ext cx="769124" cy="289107"/>
+              <a:off x="634722" y="1235119"/>
+              <a:ext cx="751583" cy="276999"/>
             </a:xfrm>
             <a:prstGeom prst="rect">
               <a:avLst/>
@@ -3613,14 +3615,14 @@
         </p:sp>
         <p:sp>
           <p:nvSpPr>
-            <p:cNvPr id="147" name="Rectangle 146"/>
+            <p:cNvPr id="47" name="Rectangle 46"/>
             <p:cNvSpPr/>
             <p:nvPr/>
           </p:nvSpPr>
           <p:spPr>
             <a:xfrm>
-              <a:off x="5801492" y="5662034"/>
-              <a:ext cx="670852" cy="289107"/>
+              <a:off x="638982" y="864046"/>
+              <a:ext cx="1665522" cy="276999"/>
             </a:xfrm>
             <a:prstGeom prst="rect">
               <a:avLst/>
@@ -3639,6 +3641,27 @@
                 </a:rPr>
                 <a:t>i-ZnTe</a:t>
               </a:r>
+              <a:r>
+                <a:rPr lang="en-US" sz="1200" dirty="0" smtClean="0">
+                  <a:latin typeface="Times New Roman" panose="02020603050405020304" pitchFamily="18" charset="0"/>
+                  <a:cs typeface="Times New Roman" panose="02020603050405020304" pitchFamily="18" charset="0"/>
+                </a:rPr>
+                <a:t> (</a:t>
+              </a:r>
+              <a:r>
+                <a:rPr lang="en-US" sz="1200" dirty="0" smtClean="0">
+                  <a:latin typeface="Times New Roman" panose="02020603050405020304" pitchFamily="18" charset="0"/>
+                  <a:cs typeface="Times New Roman" panose="02020603050405020304" pitchFamily="18" charset="0"/>
+                </a:rPr>
+                <a:t>150 - 200 </a:t>
+              </a:r>
+              <a:r>
+                <a:rPr lang="en-US" sz="1200" dirty="0" smtClean="0">
+                  <a:latin typeface="Times New Roman" panose="02020603050405020304" pitchFamily="18" charset="0"/>
+                  <a:cs typeface="Times New Roman" panose="02020603050405020304" pitchFamily="18" charset="0"/>
+                </a:rPr>
+                <a:t>nm)</a:t>
+              </a:r>
               <a:endParaRPr lang="en-US" sz="1200" dirty="0">
                 <a:latin typeface="Times New Roman" panose="02020603050405020304" pitchFamily="18" charset="0"/>
                 <a:cs typeface="Times New Roman" panose="02020603050405020304" pitchFamily="18" charset="0"/>
@@ -3648,14 +3671,14 @@
         </p:sp>
         <p:sp>
           <p:nvSpPr>
-            <p:cNvPr id="148" name="Rectangle 147"/>
+            <p:cNvPr id="48" name="Rectangle 47"/>
             <p:cNvSpPr/>
             <p:nvPr/>
           </p:nvSpPr>
           <p:spPr>
             <a:xfrm>
-              <a:off x="5072261" y="5182943"/>
-              <a:ext cx="908215" cy="289107"/>
+              <a:off x="-73617" y="366568"/>
+              <a:ext cx="887502" cy="276999"/>
             </a:xfrm>
             <a:prstGeom prst="rect">
               <a:avLst/>
@@ -3697,7 +3720,7 @@
         </p:sp>
         <p:pic>
           <p:nvPicPr>
-            <p:cNvPr id="149" name="Image 148" descr="Image3.png"/>
+            <p:cNvPr id="49" name="Image 48" descr="Image3.png"/>
             <p:cNvPicPr>
               <a:picLocks noChangeAspect="1"/>
             </p:cNvPicPr>
@@ -3712,8 +3735,8 @@
           </p:blipFill>
           <p:spPr>
             <a:xfrm>
-              <a:off x="5870644" y="4725144"/>
-              <a:ext cx="1919748" cy="602353"/>
+              <a:off x="706558" y="-116924"/>
+              <a:ext cx="1875965" cy="577126"/>
             </a:xfrm>
             <a:prstGeom prst="rect">
               <a:avLst/>
@@ -3722,14 +3745,14 @@
         </p:pic>
         <p:sp>
           <p:nvSpPr>
-            <p:cNvPr id="150" name="Rectangle 149"/>
+            <p:cNvPr id="50" name="Rectangle 49"/>
             <p:cNvSpPr/>
             <p:nvPr/>
           </p:nvSpPr>
           <p:spPr>
             <a:xfrm>
-              <a:off x="6049697" y="5072305"/>
-              <a:ext cx="422647" cy="289107"/>
+              <a:off x="881527" y="215697"/>
+              <a:ext cx="413008" cy="276999"/>
             </a:xfrm>
             <a:prstGeom prst="rect">
               <a:avLst/>
@@ -3757,14 +3780,14 @@
         </p:sp>
         <p:sp>
           <p:nvSpPr>
-            <p:cNvPr id="151" name="Ellipse 150"/>
+            <p:cNvPr id="51" name="Ellipse 50"/>
             <p:cNvSpPr/>
             <p:nvPr/>
           </p:nvSpPr>
           <p:spPr>
             <a:xfrm>
-              <a:off x="8510473" y="5741021"/>
-              <a:ext cx="432047" cy="406282"/>
+              <a:off x="3286181" y="1003972"/>
+              <a:ext cx="422194" cy="389266"/>
             </a:xfrm>
             <a:prstGeom prst="ellipse">
               <a:avLst/>
@@ -3795,14 +3818,14 @@
         </p:sp>
         <p:cxnSp>
           <p:nvCxnSpPr>
-            <p:cNvPr id="152" name="Connecteur droit 151"/>
+            <p:cNvPr id="52" name="Connecteur droit 51"/>
             <p:cNvCxnSpPr/>
             <p:nvPr/>
           </p:nvCxnSpPr>
           <p:spPr>
             <a:xfrm flipV="1">
-              <a:off x="7898404" y="4869160"/>
-              <a:ext cx="0" cy="453384"/>
+              <a:off x="2688072" y="21060"/>
+              <a:ext cx="0" cy="434396"/>
             </a:xfrm>
             <a:prstGeom prst="line">
               <a:avLst/>
@@ -3830,14 +3853,14 @@
         </p:cxnSp>
         <p:cxnSp>
           <p:nvCxnSpPr>
-            <p:cNvPr id="153" name="Connecteur droit 152"/>
+            <p:cNvPr id="53" name="Connecteur droit 52"/>
             <p:cNvCxnSpPr/>
             <p:nvPr/>
           </p:nvCxnSpPr>
           <p:spPr>
             <a:xfrm>
-              <a:off x="7898404" y="4869160"/>
-              <a:ext cx="828092" cy="0"/>
+              <a:off x="2688072" y="21060"/>
+              <a:ext cx="809206" cy="0"/>
             </a:xfrm>
             <a:prstGeom prst="line">
               <a:avLst/>
@@ -3865,16 +3888,16 @@
         </p:cxnSp>
         <p:cxnSp>
           <p:nvCxnSpPr>
-            <p:cNvPr id="154" name="Connecteur droit 153"/>
+            <p:cNvPr id="54" name="Connecteur droit 53"/>
             <p:cNvCxnSpPr>
-              <a:endCxn id="151" idx="0"/>
+              <a:endCxn id="51" idx="0"/>
             </p:cNvCxnSpPr>
             <p:nvPr/>
           </p:nvCxnSpPr>
           <p:spPr>
             <a:xfrm>
-              <a:off x="8726496" y="4869161"/>
-              <a:ext cx="0" cy="871860"/>
+              <a:off x="3497278" y="21060"/>
+              <a:ext cx="0" cy="982912"/>
             </a:xfrm>
             <a:prstGeom prst="line">
               <a:avLst/>
@@ -3902,16 +3925,16 @@
         </p:cxnSp>
         <p:cxnSp>
           <p:nvCxnSpPr>
-            <p:cNvPr id="155" name="Connecteur droit 154"/>
+            <p:cNvPr id="55" name="Connecteur droit 54"/>
             <p:cNvCxnSpPr>
-              <a:stCxn id="151" idx="4"/>
+              <a:stCxn id="51" idx="4"/>
             </p:cNvCxnSpPr>
             <p:nvPr/>
           </p:nvCxnSpPr>
           <p:spPr>
             <a:xfrm>
-              <a:off x="8726496" y="6147303"/>
-              <a:ext cx="0" cy="594065"/>
+              <a:off x="3497278" y="1393238"/>
+              <a:ext cx="0" cy="569185"/>
             </a:xfrm>
             <a:prstGeom prst="line">
               <a:avLst/>
@@ -3939,14 +3962,14 @@
         </p:cxnSp>
         <p:cxnSp>
           <p:nvCxnSpPr>
-            <p:cNvPr id="156" name="Connecteur droit 155"/>
+            <p:cNvPr id="56" name="Connecteur droit 55"/>
             <p:cNvCxnSpPr/>
             <p:nvPr/>
           </p:nvCxnSpPr>
           <p:spPr>
             <a:xfrm>
-              <a:off x="7898404" y="6319192"/>
-              <a:ext cx="0" cy="422176"/>
+              <a:off x="2688072" y="1557928"/>
+              <a:ext cx="0" cy="404495"/>
             </a:xfrm>
             <a:prstGeom prst="line">
               <a:avLst/>
@@ -3974,14 +3997,14 @@
         </p:cxnSp>
         <p:cxnSp>
           <p:nvCxnSpPr>
-            <p:cNvPr id="157" name="Connecteur droit 156"/>
+            <p:cNvPr id="57" name="Connecteur droit 56"/>
             <p:cNvCxnSpPr/>
             <p:nvPr/>
           </p:nvCxnSpPr>
           <p:spPr>
             <a:xfrm>
-              <a:off x="7898404" y="6741368"/>
-              <a:ext cx="828092" cy="0"/>
+              <a:off x="2688072" y="1962423"/>
+              <a:ext cx="809206" cy="0"/>
             </a:xfrm>
             <a:prstGeom prst="line">
               <a:avLst/>
@@ -4009,14 +4032,14 @@
         </p:cxnSp>
         <p:sp>
           <p:nvSpPr>
-            <p:cNvPr id="158" name="Rectangle 157"/>
+            <p:cNvPr id="58" name="Rectangle 57"/>
             <p:cNvSpPr/>
             <p:nvPr/>
           </p:nvSpPr>
           <p:spPr>
             <a:xfrm>
-              <a:off x="8554021" y="5703239"/>
-              <a:ext cx="321259" cy="481845"/>
+              <a:off x="3328736" y="967772"/>
+              <a:ext cx="313932" cy="461665"/>
             </a:xfrm>
             <a:prstGeom prst="rect">
               <a:avLst/>
@@ -4041,14 +4064,14 @@
         </p:sp>
         <p:sp>
           <p:nvSpPr>
-            <p:cNvPr id="159" name="Rectangle 158"/>
+            <p:cNvPr id="59" name="Rectangle 58"/>
             <p:cNvSpPr/>
             <p:nvPr/>
           </p:nvSpPr>
           <p:spPr>
             <a:xfrm>
-              <a:off x="5346521" y="5493835"/>
-              <a:ext cx="536314" cy="289107"/>
+              <a:off x="194388" y="767138"/>
+              <a:ext cx="524083" cy="276999"/>
             </a:xfrm>
             <a:prstGeom prst="rect">
               <a:avLst/>
@@ -4066,6 +4089,48 @@
                   <a:cs typeface="Times New Roman" panose="02020603050405020304" pitchFamily="18" charset="0"/>
                 </a:rPr>
                 <a:t>CdTe</a:t>
+              </a:r>
+              <a:endParaRPr lang="en-US" sz="1200" dirty="0">
+                <a:latin typeface="Times New Roman" panose="02020603050405020304" pitchFamily="18" charset="0"/>
+                <a:cs typeface="Times New Roman" panose="02020603050405020304" pitchFamily="18" charset="0"/>
+              </a:endParaRPr>
+            </a:p>
+          </p:txBody>
+        </p:sp>
+        <p:sp>
+          <p:nvSpPr>
+            <p:cNvPr id="60" name="Rectangle 59"/>
+            <p:cNvSpPr/>
+            <p:nvPr/>
+          </p:nvSpPr>
+          <p:spPr>
+            <a:xfrm>
+              <a:off x="638983" y="486000"/>
+              <a:ext cx="1305481" cy="276999"/>
+            </a:xfrm>
+            <a:prstGeom prst="rect">
+              <a:avLst/>
+            </a:prstGeom>
+          </p:spPr>
+          <p:txBody>
+            <a:bodyPr wrap="square">
+              <a:spAutoFit/>
+            </a:bodyPr>
+            <a:lstStyle/>
+            <a:p>
+              <a:r>
+                <a:rPr lang="en-US" sz="1200" dirty="0" err="1" smtClean="0">
+                  <a:latin typeface="Times New Roman" panose="02020603050405020304" pitchFamily="18" charset="0"/>
+                  <a:cs typeface="Times New Roman" panose="02020603050405020304" pitchFamily="18" charset="0"/>
+                </a:rPr>
+                <a:t>i-ZnTe</a:t>
+              </a:r>
+              <a:r>
+                <a:rPr lang="en-US" sz="1200" dirty="0" smtClean="0">
+                  <a:latin typeface="Times New Roman" panose="02020603050405020304" pitchFamily="18" charset="0"/>
+                  <a:cs typeface="Times New Roman" panose="02020603050405020304" pitchFamily="18" charset="0"/>
+                </a:rPr>
+                <a:t> (110 nm)</a:t>
               </a:r>
               <a:endParaRPr lang="en-US" sz="1200" dirty="0">
                 <a:latin typeface="Times New Roman" panose="02020603050405020304" pitchFamily="18" charset="0"/>

</xml_diff>

<commit_message>
Chap02: Correction lucien n done
</commit_message>
<xml_diff>
--- a/02-GrowthQDs/Pictures/ChargeContSample.pptx
+++ b/02-GrowthQDs/Pictures/ChargeContSample.pptx
@@ -7,7 +7,7 @@
   <p:sldIdLst>
     <p:sldId id="256" r:id="rId2"/>
   </p:sldIdLst>
-  <p:sldSz cx="3744913" cy="2124075"/>
+  <p:sldSz cx="3744913" cy="2538413"/>
   <p:notesSz cx="6858000" cy="9144000"/>
   <p:defaultTextStyle>
     <a:defPPr>
@@ -136,8 +136,8 @@
         </p:nvSpPr>
         <p:spPr>
           <a:xfrm>
-            <a:off x="280871" y="659842"/>
-            <a:ext cx="3183177" cy="455299"/>
+            <a:off x="280871" y="788558"/>
+            <a:ext cx="3183177" cy="544112"/>
           </a:xfrm>
         </p:spPr>
         <p:txBody>
@@ -164,8 +164,8 @@
         </p:nvSpPr>
         <p:spPr>
           <a:xfrm>
-            <a:off x="561739" y="1203644"/>
-            <a:ext cx="2621439" cy="542819"/>
+            <a:off x="561740" y="1438438"/>
+            <a:ext cx="2621439" cy="648704"/>
           </a:xfrm>
         </p:spPr>
         <p:txBody>
@@ -288,7 +288,7 @@
           <a:p>
             <a:fld id="{275C29BF-30DA-4EEB-B4C9-02D07A7BBEAA}" type="datetimeFigureOut">
               <a:rPr lang="fr-FR" smtClean="0"/>
-              <a:t>12/10/2017</a:t>
+              <a:t>08/11/2017</a:t>
             </a:fld>
             <a:endParaRPr lang="fr-FR"/>
           </a:p>
@@ -458,7 +458,7 @@
           <a:p>
             <a:fld id="{275C29BF-30DA-4EEB-B4C9-02D07A7BBEAA}" type="datetimeFigureOut">
               <a:rPr lang="fr-FR" smtClean="0"/>
-              <a:t>12/10/2017</a:t>
+              <a:t>08/11/2017</a:t>
             </a:fld>
             <a:endParaRPr lang="fr-FR"/>
           </a:p>
@@ -548,8 +548,8 @@
         </p:nvSpPr>
         <p:spPr>
           <a:xfrm>
-            <a:off x="2715064" y="85062"/>
-            <a:ext cx="842605" cy="1812347"/>
+            <a:off x="2715070" y="101657"/>
+            <a:ext cx="842605" cy="2165876"/>
           </a:xfrm>
         </p:spPr>
         <p:txBody>
@@ -576,8 +576,8 @@
         </p:nvSpPr>
         <p:spPr>
           <a:xfrm>
-            <a:off x="187249" y="85062"/>
-            <a:ext cx="2465401" cy="1812347"/>
+            <a:off x="187255" y="101657"/>
+            <a:ext cx="2465401" cy="2165876"/>
           </a:xfrm>
         </p:spPr>
         <p:txBody>
@@ -638,7 +638,7 @@
           <a:p>
             <a:fld id="{275C29BF-30DA-4EEB-B4C9-02D07A7BBEAA}" type="datetimeFigureOut">
               <a:rPr lang="fr-FR" smtClean="0"/>
-              <a:t>12/10/2017</a:t>
+              <a:t>08/11/2017</a:t>
             </a:fld>
             <a:endParaRPr lang="fr-FR"/>
           </a:p>
@@ -808,7 +808,7 @@
           <a:p>
             <a:fld id="{275C29BF-30DA-4EEB-B4C9-02D07A7BBEAA}" type="datetimeFigureOut">
               <a:rPr lang="fr-FR" smtClean="0"/>
-              <a:t>12/10/2017</a:t>
+              <a:t>08/11/2017</a:t>
             </a:fld>
             <a:endParaRPr lang="fr-FR"/>
           </a:p>
@@ -898,8 +898,8 @@
         </p:nvSpPr>
         <p:spPr>
           <a:xfrm>
-            <a:off x="295824" y="1364918"/>
-            <a:ext cx="3183177" cy="421865"/>
+            <a:off x="295824" y="1631173"/>
+            <a:ext cx="3183177" cy="504157"/>
           </a:xfrm>
         </p:spPr>
         <p:txBody>
@@ -930,8 +930,8 @@
         </p:nvSpPr>
         <p:spPr>
           <a:xfrm>
-            <a:off x="295824" y="900275"/>
-            <a:ext cx="3183177" cy="464641"/>
+            <a:off x="295824" y="1075891"/>
+            <a:ext cx="3183177" cy="555277"/>
           </a:xfrm>
         </p:spPr>
         <p:txBody>
@@ -1054,7 +1054,7 @@
           <a:p>
             <a:fld id="{275C29BF-30DA-4EEB-B4C9-02D07A7BBEAA}" type="datetimeFigureOut">
               <a:rPr lang="fr-FR" smtClean="0"/>
-              <a:t>12/10/2017</a:t>
+              <a:t>08/11/2017</a:t>
             </a:fld>
             <a:endParaRPr lang="fr-FR"/>
           </a:p>
@@ -1167,8 +1167,8 @@
         </p:nvSpPr>
         <p:spPr>
           <a:xfrm>
-            <a:off x="187248" y="495620"/>
-            <a:ext cx="1654004" cy="1401791"/>
+            <a:off x="187248" y="592302"/>
+            <a:ext cx="1654004" cy="1675235"/>
           </a:xfrm>
         </p:spPr>
         <p:txBody>
@@ -1252,8 +1252,8 @@
         </p:nvSpPr>
         <p:spPr>
           <a:xfrm>
-            <a:off x="1903666" y="495620"/>
-            <a:ext cx="1654004" cy="1401791"/>
+            <a:off x="1903666" y="592302"/>
+            <a:ext cx="1654004" cy="1675235"/>
           </a:xfrm>
         </p:spPr>
         <p:txBody>
@@ -1342,7 +1342,7 @@
           <a:p>
             <a:fld id="{275C29BF-30DA-4EEB-B4C9-02D07A7BBEAA}" type="datetimeFigureOut">
               <a:rPr lang="fr-FR" smtClean="0"/>
-              <a:t>12/10/2017</a:t>
+              <a:t>08/11/2017</a:t>
             </a:fld>
             <a:endParaRPr lang="fr-FR"/>
           </a:p>
@@ -1459,8 +1459,8 @@
         </p:nvSpPr>
         <p:spPr>
           <a:xfrm>
-            <a:off x="187248" y="475459"/>
-            <a:ext cx="1654654" cy="198148"/>
+            <a:off x="187248" y="568206"/>
+            <a:ext cx="1654654" cy="236799"/>
           </a:xfrm>
         </p:spPr>
         <p:txBody>
@@ -1524,8 +1524,8 @@
         </p:nvSpPr>
         <p:spPr>
           <a:xfrm>
-            <a:off x="187248" y="673607"/>
-            <a:ext cx="1654654" cy="1223802"/>
+            <a:off x="187248" y="805005"/>
+            <a:ext cx="1654654" cy="1462525"/>
           </a:xfrm>
         </p:spPr>
         <p:txBody>
@@ -1609,8 +1609,8 @@
         </p:nvSpPr>
         <p:spPr>
           <a:xfrm>
-            <a:off x="1902366" y="475459"/>
-            <a:ext cx="1655303" cy="198148"/>
+            <a:off x="1902372" y="568206"/>
+            <a:ext cx="1655303" cy="236799"/>
           </a:xfrm>
         </p:spPr>
         <p:txBody>
@@ -1674,8 +1674,8 @@
         </p:nvSpPr>
         <p:spPr>
           <a:xfrm>
-            <a:off x="1902366" y="673607"/>
-            <a:ext cx="1655303" cy="1223802"/>
+            <a:off x="1902372" y="805005"/>
+            <a:ext cx="1655303" cy="1462525"/>
           </a:xfrm>
         </p:spPr>
         <p:txBody>
@@ -1764,7 +1764,7 @@
           <a:p>
             <a:fld id="{275C29BF-30DA-4EEB-B4C9-02D07A7BBEAA}" type="datetimeFigureOut">
               <a:rPr lang="fr-FR" smtClean="0"/>
-              <a:t>12/10/2017</a:t>
+              <a:t>08/11/2017</a:t>
             </a:fld>
             <a:endParaRPr lang="fr-FR"/>
           </a:p>
@@ -1882,7 +1882,7 @@
           <a:p>
             <a:fld id="{275C29BF-30DA-4EEB-B4C9-02D07A7BBEAA}" type="datetimeFigureOut">
               <a:rPr lang="fr-FR" smtClean="0"/>
-              <a:t>12/10/2017</a:t>
+              <a:t>08/11/2017</a:t>
             </a:fld>
             <a:endParaRPr lang="fr-FR"/>
           </a:p>
@@ -1977,7 +1977,7 @@
           <a:p>
             <a:fld id="{275C29BF-30DA-4EEB-B4C9-02D07A7BBEAA}" type="datetimeFigureOut">
               <a:rPr lang="fr-FR" smtClean="0"/>
-              <a:t>12/10/2017</a:t>
+              <a:t>08/11/2017</a:t>
             </a:fld>
             <a:endParaRPr lang="fr-FR"/>
           </a:p>
@@ -2067,8 +2067,8 @@
         </p:nvSpPr>
         <p:spPr>
           <a:xfrm>
-            <a:off x="187248" y="84571"/>
-            <a:ext cx="1232051" cy="359914"/>
+            <a:off x="187254" y="101067"/>
+            <a:ext cx="1232051" cy="430123"/>
           </a:xfrm>
         </p:spPr>
         <p:txBody>
@@ -2099,8 +2099,8 @@
         </p:nvSpPr>
         <p:spPr>
           <a:xfrm>
-            <a:off x="1464160" y="84572"/>
-            <a:ext cx="2093511" cy="1812838"/>
+            <a:off x="1464166" y="101069"/>
+            <a:ext cx="2093511" cy="2166463"/>
           </a:xfrm>
         </p:spPr>
         <p:txBody>
@@ -2184,8 +2184,8 @@
         </p:nvSpPr>
         <p:spPr>
           <a:xfrm>
-            <a:off x="187248" y="444482"/>
-            <a:ext cx="1232051" cy="1452927"/>
+            <a:off x="187254" y="531188"/>
+            <a:ext cx="1232051" cy="1736346"/>
           </a:xfrm>
         </p:spPr>
         <p:txBody>
@@ -2254,7 +2254,7 @@
           <a:p>
             <a:fld id="{275C29BF-30DA-4EEB-B4C9-02D07A7BBEAA}" type="datetimeFigureOut">
               <a:rPr lang="fr-FR" smtClean="0"/>
-              <a:t>12/10/2017</a:t>
+              <a:t>08/11/2017</a:t>
             </a:fld>
             <a:endParaRPr lang="fr-FR"/>
           </a:p>
@@ -2344,8 +2344,8 @@
         </p:nvSpPr>
         <p:spPr>
           <a:xfrm>
-            <a:off x="734029" y="1486854"/>
-            <a:ext cx="2246948" cy="175531"/>
+            <a:off x="734029" y="1776893"/>
+            <a:ext cx="2246948" cy="209772"/>
           </a:xfrm>
         </p:spPr>
         <p:txBody>
@@ -2376,8 +2376,8 @@
         </p:nvSpPr>
         <p:spPr>
           <a:xfrm>
-            <a:off x="734029" y="189793"/>
-            <a:ext cx="2246948" cy="1274445"/>
+            <a:off x="734029" y="226818"/>
+            <a:ext cx="2246948" cy="1523048"/>
           </a:xfrm>
         </p:spPr>
         <p:txBody>
@@ -2437,8 +2437,8 @@
         </p:nvSpPr>
         <p:spPr>
           <a:xfrm>
-            <a:off x="734029" y="1662386"/>
-            <a:ext cx="2246948" cy="249284"/>
+            <a:off x="734029" y="1986665"/>
+            <a:ext cx="2246948" cy="297911"/>
           </a:xfrm>
         </p:spPr>
         <p:txBody>
@@ -2507,7 +2507,7 @@
           <a:p>
             <a:fld id="{275C29BF-30DA-4EEB-B4C9-02D07A7BBEAA}" type="datetimeFigureOut">
               <a:rPr lang="fr-FR" smtClean="0"/>
-              <a:t>12/10/2017</a:t>
+              <a:t>08/11/2017</a:t>
             </a:fld>
             <a:endParaRPr lang="fr-FR"/>
           </a:p>
@@ -2602,8 +2602,8 @@
         </p:nvSpPr>
         <p:spPr>
           <a:xfrm>
-            <a:off x="187247" y="85065"/>
-            <a:ext cx="3370422" cy="354013"/>
+            <a:off x="187247" y="101662"/>
+            <a:ext cx="3370422" cy="423071"/>
           </a:xfrm>
           <a:prstGeom prst="rect">
             <a:avLst/>
@@ -2635,8 +2635,8 @@
         </p:nvSpPr>
         <p:spPr>
           <a:xfrm>
-            <a:off x="187247" y="495620"/>
-            <a:ext cx="3370422" cy="1401791"/>
+            <a:off x="187247" y="592302"/>
+            <a:ext cx="3370422" cy="1675235"/>
           </a:xfrm>
           <a:prstGeom prst="rect">
             <a:avLst/>
@@ -2697,8 +2697,8 @@
         </p:nvSpPr>
         <p:spPr>
           <a:xfrm>
-            <a:off x="187246" y="1968704"/>
-            <a:ext cx="873814" cy="113087"/>
+            <a:off x="187246" y="2352736"/>
+            <a:ext cx="873814" cy="135145"/>
           </a:xfrm>
           <a:prstGeom prst="rect">
             <a:avLst/>
@@ -2720,7 +2720,7 @@
           <a:p>
             <a:fld id="{275C29BF-30DA-4EEB-B4C9-02D07A7BBEAA}" type="datetimeFigureOut">
               <a:rPr lang="fr-FR" smtClean="0"/>
-              <a:t>12/10/2017</a:t>
+              <a:t>08/11/2017</a:t>
             </a:fld>
             <a:endParaRPr lang="fr-FR"/>
           </a:p>
@@ -2738,8 +2738,8 @@
         </p:nvSpPr>
         <p:spPr>
           <a:xfrm>
-            <a:off x="1279515" y="1968704"/>
-            <a:ext cx="1185889" cy="113087"/>
+            <a:off x="1279515" y="2352736"/>
+            <a:ext cx="1185889" cy="135145"/>
           </a:xfrm>
           <a:prstGeom prst="rect">
             <a:avLst/>
@@ -2775,8 +2775,8 @@
         </p:nvSpPr>
         <p:spPr>
           <a:xfrm>
-            <a:off x="2683855" y="1968704"/>
-            <a:ext cx="873814" cy="113087"/>
+            <a:off x="2683855" y="2352736"/>
+            <a:ext cx="873814" cy="135145"/>
           </a:xfrm>
           <a:prstGeom prst="rect">
             <a:avLst/>
@@ -3097,27 +3097,27 @@
       </p:grpSpPr>
       <p:grpSp>
         <p:nvGrpSpPr>
-          <p:cNvPr id="34" name="Groupe 33"/>
+          <p:cNvPr id="6" name="Groupe 5"/>
           <p:cNvGrpSpPr/>
           <p:nvPr/>
         </p:nvGrpSpPr>
         <p:grpSpPr>
           <a:xfrm>
             <a:off x="-73617" y="8835"/>
-            <a:ext cx="3781992" cy="2079347"/>
-            <a:chOff x="-73617" y="-116924"/>
-            <a:chExt cx="3781992" cy="2079347"/>
+            <a:ext cx="3781992" cy="2529271"/>
+            <a:chOff x="-73617" y="8835"/>
+            <a:chExt cx="3781992" cy="2529271"/>
           </a:xfrm>
         </p:grpSpPr>
         <p:sp>
           <p:nvSpPr>
-            <p:cNvPr id="35" name="Rectangle 34"/>
+            <p:cNvPr id="208" name="Rectangle 207"/>
             <p:cNvSpPr/>
             <p:nvPr/>
           </p:nvSpPr>
           <p:spPr>
             <a:xfrm>
-              <a:off x="682648" y="1134516"/>
+              <a:off x="682648" y="1260275"/>
               <a:ext cx="2181338" cy="423412"/>
             </a:xfrm>
             <a:prstGeom prst="rect">
@@ -3157,13 +3157,13 @@
         </p:sp>
         <p:sp>
           <p:nvSpPr>
-            <p:cNvPr id="36" name="Rectangle 35"/>
+            <p:cNvPr id="209" name="Rectangle 208"/>
             <p:cNvSpPr/>
             <p:nvPr/>
           </p:nvSpPr>
           <p:spPr>
             <a:xfrm>
-              <a:off x="682648" y="811728"/>
+              <a:off x="682648" y="937487"/>
               <a:ext cx="2181338" cy="43804"/>
             </a:xfrm>
             <a:prstGeom prst="rect">
@@ -3203,13 +3203,13 @@
         </p:sp>
         <p:sp>
           <p:nvSpPr>
-            <p:cNvPr id="37" name="Ellipse 36"/>
+            <p:cNvPr id="210" name="Ellipse 209"/>
             <p:cNvSpPr/>
             <p:nvPr/>
           </p:nvSpPr>
           <p:spPr>
             <a:xfrm>
-              <a:off x="784780" y="717547"/>
+              <a:off x="784780" y="843306"/>
               <a:ext cx="211097" cy="137984"/>
             </a:xfrm>
             <a:prstGeom prst="ellipse">
@@ -3249,13 +3249,13 @@
         </p:sp>
         <p:sp>
           <p:nvSpPr>
-            <p:cNvPr id="38" name="Ellipse 37"/>
+            <p:cNvPr id="211" name="Ellipse 210"/>
             <p:cNvSpPr/>
             <p:nvPr/>
           </p:nvSpPr>
           <p:spPr>
             <a:xfrm>
-              <a:off x="1175208" y="717547"/>
+              <a:off x="1175208" y="843306"/>
               <a:ext cx="211097" cy="137984"/>
             </a:xfrm>
             <a:prstGeom prst="ellipse">
@@ -3295,13 +3295,13 @@
         </p:sp>
         <p:sp>
           <p:nvSpPr>
-            <p:cNvPr id="39" name="Ellipse 38"/>
+            <p:cNvPr id="212" name="Ellipse 211"/>
             <p:cNvSpPr/>
             <p:nvPr/>
           </p:nvSpPr>
           <p:spPr>
             <a:xfrm>
-              <a:off x="1456671" y="717547"/>
+              <a:off x="1456671" y="843306"/>
               <a:ext cx="211097" cy="137984"/>
             </a:xfrm>
             <a:prstGeom prst="ellipse">
@@ -3341,13 +3341,13 @@
         </p:sp>
         <p:sp>
           <p:nvSpPr>
-            <p:cNvPr id="40" name="Ellipse 39"/>
+            <p:cNvPr id="213" name="Ellipse 212"/>
             <p:cNvSpPr/>
             <p:nvPr/>
           </p:nvSpPr>
           <p:spPr>
             <a:xfrm>
-              <a:off x="2019597" y="717547"/>
+              <a:off x="2019597" y="843306"/>
               <a:ext cx="211097" cy="137984"/>
             </a:xfrm>
             <a:prstGeom prst="ellipse">
@@ -3387,13 +3387,13 @@
         </p:sp>
         <p:sp>
           <p:nvSpPr>
-            <p:cNvPr id="41" name="Ellipse 40"/>
+            <p:cNvPr id="214" name="Ellipse 213"/>
             <p:cNvSpPr/>
             <p:nvPr/>
           </p:nvSpPr>
           <p:spPr>
             <a:xfrm>
-              <a:off x="2582523" y="717547"/>
+              <a:off x="2582523" y="843306"/>
               <a:ext cx="211097" cy="137984"/>
             </a:xfrm>
             <a:prstGeom prst="ellipse">
@@ -3433,13 +3433,13 @@
         </p:sp>
         <p:sp>
           <p:nvSpPr>
-            <p:cNvPr id="42" name="Rectangle 41"/>
+            <p:cNvPr id="215" name="Rectangle 214"/>
             <p:cNvSpPr/>
             <p:nvPr/>
           </p:nvSpPr>
           <p:spPr>
             <a:xfrm>
-              <a:off x="682648" y="460202"/>
+              <a:off x="682648" y="585961"/>
               <a:ext cx="2181338" cy="43804"/>
             </a:xfrm>
             <a:prstGeom prst="rect">
@@ -3479,16 +3479,16 @@
         </p:sp>
         <p:cxnSp>
           <p:nvCxnSpPr>
-            <p:cNvPr id="43" name="Connecteur droit 42"/>
+            <p:cNvPr id="216" name="Connecteur droit 215"/>
             <p:cNvCxnSpPr>
-              <a:endCxn id="42" idx="1"/>
+              <a:endCxn id="215" idx="1"/>
             </p:cNvCxnSpPr>
             <p:nvPr/>
           </p:nvCxnSpPr>
           <p:spPr>
             <a:xfrm flipV="1">
-              <a:off x="672653" y="482104"/>
-              <a:ext cx="9995" cy="1075825"/>
+              <a:off x="682648" y="607863"/>
+              <a:ext cx="0" cy="1075826"/>
             </a:xfrm>
             <a:prstGeom prst="line">
               <a:avLst/>
@@ -3511,15 +3511,15 @@
         </p:cxnSp>
         <p:cxnSp>
           <p:nvCxnSpPr>
-            <p:cNvPr id="44" name="Connecteur droit 43"/>
+            <p:cNvPr id="217" name="Connecteur droit 216"/>
             <p:cNvCxnSpPr>
-              <a:endCxn id="42" idx="3"/>
+              <a:endCxn id="215" idx="3"/>
             </p:cNvCxnSpPr>
             <p:nvPr/>
           </p:nvCxnSpPr>
           <p:spPr>
             <a:xfrm flipH="1" flipV="1">
-              <a:off x="2863986" y="482104"/>
+              <a:off x="2863986" y="607863"/>
               <a:ext cx="1" cy="1075826"/>
             </a:xfrm>
             <a:prstGeom prst="line">
@@ -3543,13 +3543,13 @@
         </p:cxnSp>
         <p:cxnSp>
           <p:nvCxnSpPr>
-            <p:cNvPr id="45" name="Connecteur droit 44"/>
+            <p:cNvPr id="218" name="Connecteur droit 217"/>
             <p:cNvCxnSpPr/>
             <p:nvPr/>
           </p:nvCxnSpPr>
           <p:spPr>
             <a:xfrm>
-              <a:off x="682648" y="504006"/>
+              <a:off x="682648" y="629765"/>
               <a:ext cx="2181338" cy="0"/>
             </a:xfrm>
             <a:prstGeom prst="line">
@@ -3573,13 +3573,13 @@
         </p:cxnSp>
         <p:sp>
           <p:nvSpPr>
-            <p:cNvPr id="46" name="Rectangle 45"/>
+            <p:cNvPr id="219" name="Rectangle 218"/>
             <p:cNvSpPr/>
             <p:nvPr/>
           </p:nvSpPr>
           <p:spPr>
             <a:xfrm>
-              <a:off x="634722" y="1235119"/>
+              <a:off x="634722" y="1360878"/>
               <a:ext cx="751583" cy="276999"/>
             </a:xfrm>
             <a:prstGeom prst="rect">
@@ -3615,13 +3615,13 @@
         </p:sp>
         <p:sp>
           <p:nvSpPr>
-            <p:cNvPr id="47" name="Rectangle 46"/>
+            <p:cNvPr id="220" name="Rectangle 219"/>
             <p:cNvSpPr/>
             <p:nvPr/>
           </p:nvSpPr>
           <p:spPr>
             <a:xfrm>
-              <a:off x="638982" y="864046"/>
+              <a:off x="638982" y="989805"/>
               <a:ext cx="1665522" cy="276999"/>
             </a:xfrm>
             <a:prstGeom prst="rect">
@@ -3646,21 +3646,7 @@
                   <a:latin typeface="Times New Roman" panose="02020603050405020304" pitchFamily="18" charset="0"/>
                   <a:cs typeface="Times New Roman" panose="02020603050405020304" pitchFamily="18" charset="0"/>
                 </a:rPr>
-                <a:t> (</a:t>
-              </a:r>
-              <a:r>
-                <a:rPr lang="en-US" sz="1200" dirty="0" smtClean="0">
-                  <a:latin typeface="Times New Roman" panose="02020603050405020304" pitchFamily="18" charset="0"/>
-                  <a:cs typeface="Times New Roman" panose="02020603050405020304" pitchFamily="18" charset="0"/>
-                </a:rPr>
-                <a:t>150 - 200 </a:t>
-              </a:r>
-              <a:r>
-                <a:rPr lang="en-US" sz="1200" dirty="0" smtClean="0">
-                  <a:latin typeface="Times New Roman" panose="02020603050405020304" pitchFamily="18" charset="0"/>
-                  <a:cs typeface="Times New Roman" panose="02020603050405020304" pitchFamily="18" charset="0"/>
-                </a:rPr>
-                <a:t>nm)</a:t>
+                <a:t> (150 - 200 nm)</a:t>
               </a:r>
               <a:endParaRPr lang="en-US" sz="1200" dirty="0">
                 <a:latin typeface="Times New Roman" panose="02020603050405020304" pitchFamily="18" charset="0"/>
@@ -3671,13 +3657,13 @@
         </p:sp>
         <p:sp>
           <p:nvSpPr>
-            <p:cNvPr id="48" name="Rectangle 47"/>
+            <p:cNvPr id="221" name="Rectangle 220"/>
             <p:cNvSpPr/>
             <p:nvPr/>
           </p:nvSpPr>
           <p:spPr>
             <a:xfrm>
-              <a:off x="-73617" y="366568"/>
+              <a:off x="-73617" y="492327"/>
               <a:ext cx="887502" cy="276999"/>
             </a:xfrm>
             <a:prstGeom prst="rect">
@@ -3720,7 +3706,7 @@
         </p:sp>
         <p:pic>
           <p:nvPicPr>
-            <p:cNvPr id="49" name="Image 48" descr="Image3.png"/>
+            <p:cNvPr id="222" name="Image 221" descr="Image3.png"/>
             <p:cNvPicPr>
               <a:picLocks noChangeAspect="1"/>
             </p:cNvPicPr>
@@ -3735,7 +3721,7 @@
           </p:blipFill>
           <p:spPr>
             <a:xfrm>
-              <a:off x="706558" y="-116924"/>
+              <a:off x="706558" y="8835"/>
               <a:ext cx="1875965" cy="577126"/>
             </a:xfrm>
             <a:prstGeom prst="rect">
@@ -3745,13 +3731,13 @@
         </p:pic>
         <p:sp>
           <p:nvSpPr>
-            <p:cNvPr id="50" name="Rectangle 49"/>
+            <p:cNvPr id="223" name="Rectangle 222"/>
             <p:cNvSpPr/>
             <p:nvPr/>
           </p:nvSpPr>
           <p:spPr>
             <a:xfrm>
-              <a:off x="881527" y="215697"/>
+              <a:off x="881527" y="341456"/>
               <a:ext cx="413008" cy="276999"/>
             </a:xfrm>
             <a:prstGeom prst="rect">
@@ -3780,13 +3766,13 @@
         </p:sp>
         <p:sp>
           <p:nvSpPr>
-            <p:cNvPr id="51" name="Ellipse 50"/>
+            <p:cNvPr id="224" name="Ellipse 223"/>
             <p:cNvSpPr/>
             <p:nvPr/>
           </p:nvSpPr>
           <p:spPr>
             <a:xfrm>
-              <a:off x="3286181" y="1003972"/>
+              <a:off x="3286181" y="1129731"/>
               <a:ext cx="422194" cy="389266"/>
             </a:xfrm>
             <a:prstGeom prst="ellipse">
@@ -3818,13 +3804,13 @@
         </p:sp>
         <p:cxnSp>
           <p:nvCxnSpPr>
-            <p:cNvPr id="52" name="Connecteur droit 51"/>
+            <p:cNvPr id="225" name="Connecteur droit 224"/>
             <p:cNvCxnSpPr/>
             <p:nvPr/>
           </p:nvCxnSpPr>
           <p:spPr>
             <a:xfrm flipV="1">
-              <a:off x="2688072" y="21060"/>
+              <a:off x="2688072" y="146819"/>
               <a:ext cx="0" cy="434396"/>
             </a:xfrm>
             <a:prstGeom prst="line">
@@ -3832,7 +3818,7 @@
             </a:prstGeom>
             <a:ln>
               <a:solidFill>
-                <a:srgbClr val="0070C0"/>
+                <a:schemeClr val="tx1"/>
               </a:solidFill>
             </a:ln>
           </p:spPr>
@@ -3853,13 +3839,13 @@
         </p:cxnSp>
         <p:cxnSp>
           <p:nvCxnSpPr>
-            <p:cNvPr id="53" name="Connecteur droit 52"/>
+            <p:cNvPr id="226" name="Connecteur droit 225"/>
             <p:cNvCxnSpPr/>
             <p:nvPr/>
           </p:nvCxnSpPr>
           <p:spPr>
             <a:xfrm>
-              <a:off x="2688072" y="21060"/>
+              <a:off x="2688072" y="146819"/>
               <a:ext cx="809206" cy="0"/>
             </a:xfrm>
             <a:prstGeom prst="line">
@@ -3867,7 +3853,7 @@
             </a:prstGeom>
             <a:ln>
               <a:solidFill>
-                <a:srgbClr val="0070C0"/>
+                <a:schemeClr val="tx1"/>
               </a:solidFill>
             </a:ln>
           </p:spPr>
@@ -3888,15 +3874,15 @@
         </p:cxnSp>
         <p:cxnSp>
           <p:nvCxnSpPr>
-            <p:cNvPr id="54" name="Connecteur droit 53"/>
+            <p:cNvPr id="227" name="Connecteur droit 226"/>
             <p:cNvCxnSpPr>
-              <a:endCxn id="51" idx="0"/>
+              <a:endCxn id="224" idx="0"/>
             </p:cNvCxnSpPr>
             <p:nvPr/>
           </p:nvCxnSpPr>
           <p:spPr>
             <a:xfrm>
-              <a:off x="3497278" y="21060"/>
+              <a:off x="3497278" y="146819"/>
               <a:ext cx="0" cy="982912"/>
             </a:xfrm>
             <a:prstGeom prst="line">
@@ -3904,7 +3890,7 @@
             </a:prstGeom>
             <a:ln>
               <a:solidFill>
-                <a:srgbClr val="0070C0"/>
+                <a:schemeClr val="tx1"/>
               </a:solidFill>
             </a:ln>
           </p:spPr>
@@ -3925,15 +3911,15 @@
         </p:cxnSp>
         <p:cxnSp>
           <p:nvCxnSpPr>
-            <p:cNvPr id="55" name="Connecteur droit 54"/>
+            <p:cNvPr id="228" name="Connecteur droit 227"/>
             <p:cNvCxnSpPr>
-              <a:stCxn id="51" idx="4"/>
+              <a:stCxn id="224" idx="4"/>
             </p:cNvCxnSpPr>
             <p:nvPr/>
           </p:nvCxnSpPr>
           <p:spPr>
             <a:xfrm>
-              <a:off x="3497278" y="1393238"/>
+              <a:off x="3497278" y="1518997"/>
               <a:ext cx="0" cy="569185"/>
             </a:xfrm>
             <a:prstGeom prst="line">
@@ -3941,7 +3927,7 @@
             </a:prstGeom>
             <a:ln>
               <a:solidFill>
-                <a:srgbClr val="0070C0"/>
+                <a:schemeClr val="tx1"/>
               </a:solidFill>
             </a:ln>
           </p:spPr>
@@ -3962,21 +3948,21 @@
         </p:cxnSp>
         <p:cxnSp>
           <p:nvCxnSpPr>
-            <p:cNvPr id="56" name="Connecteur droit 55"/>
+            <p:cNvPr id="229" name="Connecteur droit 228"/>
             <p:cNvCxnSpPr/>
             <p:nvPr/>
           </p:nvCxnSpPr>
           <p:spPr>
             <a:xfrm>
-              <a:off x="2688072" y="1557928"/>
-              <a:ext cx="0" cy="404495"/>
+              <a:off x="2688072" y="1683687"/>
+              <a:ext cx="0" cy="674494"/>
             </a:xfrm>
             <a:prstGeom prst="line">
               <a:avLst/>
             </a:prstGeom>
             <a:ln>
               <a:solidFill>
-                <a:srgbClr val="0070C0"/>
+                <a:schemeClr val="tx1"/>
               </a:solidFill>
             </a:ln>
           </p:spPr>
@@ -3997,13 +3983,13 @@
         </p:cxnSp>
         <p:cxnSp>
           <p:nvCxnSpPr>
-            <p:cNvPr id="57" name="Connecteur droit 56"/>
+            <p:cNvPr id="230" name="Connecteur droit 229"/>
             <p:cNvCxnSpPr/>
             <p:nvPr/>
           </p:nvCxnSpPr>
           <p:spPr>
             <a:xfrm>
-              <a:off x="2688072" y="1962423"/>
+              <a:off x="2688072" y="2088182"/>
               <a:ext cx="809206" cy="0"/>
             </a:xfrm>
             <a:prstGeom prst="line">
@@ -4011,7 +3997,7 @@
             </a:prstGeom>
             <a:ln>
               <a:solidFill>
-                <a:srgbClr val="0070C0"/>
+                <a:schemeClr val="tx1"/>
               </a:solidFill>
             </a:ln>
           </p:spPr>
@@ -4032,13 +4018,13 @@
         </p:cxnSp>
         <p:sp>
           <p:nvSpPr>
-            <p:cNvPr id="58" name="Rectangle 57"/>
+            <p:cNvPr id="231" name="Rectangle 230"/>
             <p:cNvSpPr/>
             <p:nvPr/>
           </p:nvSpPr>
           <p:spPr>
             <a:xfrm>
-              <a:off x="3328736" y="967772"/>
+              <a:off x="3328736" y="1093531"/>
               <a:ext cx="313932" cy="461665"/>
             </a:xfrm>
             <a:prstGeom prst="rect">
@@ -4064,13 +4050,13 @@
         </p:sp>
         <p:sp>
           <p:nvSpPr>
-            <p:cNvPr id="59" name="Rectangle 58"/>
+            <p:cNvPr id="232" name="Rectangle 231"/>
             <p:cNvSpPr/>
             <p:nvPr/>
           </p:nvSpPr>
           <p:spPr>
             <a:xfrm>
-              <a:off x="194388" y="767138"/>
+              <a:off x="194388" y="892897"/>
               <a:ext cx="524083" cy="276999"/>
             </a:xfrm>
             <a:prstGeom prst="rect">
@@ -4099,13 +4085,13 @@
         </p:sp>
         <p:sp>
           <p:nvSpPr>
-            <p:cNvPr id="60" name="Rectangle 59"/>
+            <p:cNvPr id="233" name="Rectangle 232"/>
             <p:cNvSpPr/>
             <p:nvPr/>
           </p:nvSpPr>
           <p:spPr>
             <a:xfrm>
-              <a:off x="638983" y="486000"/>
+              <a:off x="638983" y="611759"/>
               <a:ext cx="1305481" cy="276999"/>
             </a:xfrm>
             <a:prstGeom prst="rect">
@@ -4139,6 +4125,286 @@
             </a:p>
           </p:txBody>
         </p:sp>
+        <p:cxnSp>
+          <p:nvCxnSpPr>
+            <p:cNvPr id="234" name="Connecteur droit 233"/>
+            <p:cNvCxnSpPr/>
+            <p:nvPr/>
+          </p:nvCxnSpPr>
+          <p:spPr>
+            <a:xfrm flipV="1">
+              <a:off x="2534400" y="2357925"/>
+              <a:ext cx="320400" cy="256"/>
+            </a:xfrm>
+            <a:prstGeom prst="line">
+              <a:avLst/>
+            </a:prstGeom>
+            <a:ln>
+              <a:solidFill>
+                <a:schemeClr val="tx1"/>
+              </a:solidFill>
+            </a:ln>
+          </p:spPr>
+          <p:style>
+            <a:lnRef idx="1">
+              <a:schemeClr val="accent1"/>
+            </a:lnRef>
+            <a:fillRef idx="0">
+              <a:schemeClr val="accent1"/>
+            </a:fillRef>
+            <a:effectRef idx="0">
+              <a:schemeClr val="accent1"/>
+            </a:effectRef>
+            <a:fontRef idx="minor">
+              <a:schemeClr val="tx1"/>
+            </a:fontRef>
+          </p:style>
+        </p:cxnSp>
+        <p:cxnSp>
+          <p:nvCxnSpPr>
+            <p:cNvPr id="235" name="Connecteur droit 234"/>
+            <p:cNvCxnSpPr/>
+            <p:nvPr/>
+          </p:nvCxnSpPr>
+          <p:spPr>
+            <a:xfrm flipH="1">
+              <a:off x="2515752" y="2358106"/>
+              <a:ext cx="72000" cy="180000"/>
+            </a:xfrm>
+            <a:prstGeom prst="line">
+              <a:avLst/>
+            </a:prstGeom>
+            <a:ln>
+              <a:solidFill>
+                <a:schemeClr val="tx1"/>
+              </a:solidFill>
+            </a:ln>
+          </p:spPr>
+          <p:style>
+            <a:lnRef idx="1">
+              <a:schemeClr val="accent1"/>
+            </a:lnRef>
+            <a:fillRef idx="0">
+              <a:schemeClr val="accent1"/>
+            </a:fillRef>
+            <a:effectRef idx="0">
+              <a:schemeClr val="accent1"/>
+            </a:effectRef>
+            <a:fontRef idx="minor">
+              <a:schemeClr val="tx1"/>
+            </a:fontRef>
+          </p:style>
+        </p:cxnSp>
+        <p:cxnSp>
+          <p:nvCxnSpPr>
+            <p:cNvPr id="236" name="Connecteur droit 235"/>
+            <p:cNvCxnSpPr/>
+            <p:nvPr/>
+          </p:nvCxnSpPr>
+          <p:spPr>
+            <a:xfrm flipH="1">
+              <a:off x="2726848" y="2358106"/>
+              <a:ext cx="72000" cy="180000"/>
+            </a:xfrm>
+            <a:prstGeom prst="line">
+              <a:avLst/>
+            </a:prstGeom>
+            <a:ln>
+              <a:solidFill>
+                <a:schemeClr val="tx1"/>
+              </a:solidFill>
+            </a:ln>
+          </p:spPr>
+          <p:style>
+            <a:lnRef idx="1">
+              <a:schemeClr val="accent1"/>
+            </a:lnRef>
+            <a:fillRef idx="0">
+              <a:schemeClr val="accent1"/>
+            </a:fillRef>
+            <a:effectRef idx="0">
+              <a:schemeClr val="accent1"/>
+            </a:effectRef>
+            <a:fontRef idx="minor">
+              <a:schemeClr val="tx1"/>
+            </a:fontRef>
+          </p:style>
+        </p:cxnSp>
+        <p:cxnSp>
+          <p:nvCxnSpPr>
+            <p:cNvPr id="237" name="Connecteur droit 236"/>
+            <p:cNvCxnSpPr/>
+            <p:nvPr/>
+          </p:nvCxnSpPr>
+          <p:spPr>
+            <a:xfrm flipH="1">
+              <a:off x="2621300" y="2358106"/>
+              <a:ext cx="72000" cy="180000"/>
+            </a:xfrm>
+            <a:prstGeom prst="line">
+              <a:avLst/>
+            </a:prstGeom>
+            <a:ln>
+              <a:solidFill>
+                <a:schemeClr val="tx1"/>
+              </a:solidFill>
+            </a:ln>
+          </p:spPr>
+          <p:style>
+            <a:lnRef idx="1">
+              <a:schemeClr val="accent1"/>
+            </a:lnRef>
+            <a:fillRef idx="0">
+              <a:schemeClr val="accent1"/>
+            </a:fillRef>
+            <a:effectRef idx="0">
+              <a:schemeClr val="accent1"/>
+            </a:effectRef>
+            <a:fontRef idx="minor">
+              <a:schemeClr val="tx1"/>
+            </a:fontRef>
+          </p:style>
+        </p:cxnSp>
+        <p:cxnSp>
+          <p:nvCxnSpPr>
+            <p:cNvPr id="238" name="Connecteur droit 237"/>
+            <p:cNvCxnSpPr/>
+            <p:nvPr/>
+          </p:nvCxnSpPr>
+          <p:spPr>
+            <a:xfrm flipH="1">
+              <a:off x="2673624" y="2358106"/>
+              <a:ext cx="72000" cy="180000"/>
+            </a:xfrm>
+            <a:prstGeom prst="line">
+              <a:avLst/>
+            </a:prstGeom>
+            <a:ln>
+              <a:solidFill>
+                <a:schemeClr val="tx1"/>
+              </a:solidFill>
+            </a:ln>
+          </p:spPr>
+          <p:style>
+            <a:lnRef idx="1">
+              <a:schemeClr val="accent1"/>
+            </a:lnRef>
+            <a:fillRef idx="0">
+              <a:schemeClr val="accent1"/>
+            </a:fillRef>
+            <a:effectRef idx="0">
+              <a:schemeClr val="accent1"/>
+            </a:effectRef>
+            <a:fontRef idx="minor">
+              <a:schemeClr val="tx1"/>
+            </a:fontRef>
+          </p:style>
+        </p:cxnSp>
+        <p:cxnSp>
+          <p:nvCxnSpPr>
+            <p:cNvPr id="239" name="Connecteur droit 238"/>
+            <p:cNvCxnSpPr/>
+            <p:nvPr/>
+          </p:nvCxnSpPr>
+          <p:spPr>
+            <a:xfrm flipH="1">
+              <a:off x="2569224" y="2357925"/>
+              <a:ext cx="72000" cy="180000"/>
+            </a:xfrm>
+            <a:prstGeom prst="line">
+              <a:avLst/>
+            </a:prstGeom>
+            <a:ln>
+              <a:solidFill>
+                <a:schemeClr val="tx1"/>
+              </a:solidFill>
+            </a:ln>
+          </p:spPr>
+          <p:style>
+            <a:lnRef idx="1">
+              <a:schemeClr val="accent1"/>
+            </a:lnRef>
+            <a:fillRef idx="0">
+              <a:schemeClr val="accent1"/>
+            </a:fillRef>
+            <a:effectRef idx="0">
+              <a:schemeClr val="accent1"/>
+            </a:effectRef>
+            <a:fontRef idx="minor">
+              <a:schemeClr val="tx1"/>
+            </a:fontRef>
+          </p:style>
+        </p:cxnSp>
+        <p:cxnSp>
+          <p:nvCxnSpPr>
+            <p:cNvPr id="240" name="Connecteur droit 239"/>
+            <p:cNvCxnSpPr/>
+            <p:nvPr/>
+          </p:nvCxnSpPr>
+          <p:spPr>
+            <a:xfrm flipH="1">
+              <a:off x="2782800" y="2358000"/>
+              <a:ext cx="72000" cy="180000"/>
+            </a:xfrm>
+            <a:prstGeom prst="line">
+              <a:avLst/>
+            </a:prstGeom>
+            <a:ln>
+              <a:solidFill>
+                <a:schemeClr val="tx1"/>
+              </a:solidFill>
+            </a:ln>
+          </p:spPr>
+          <p:style>
+            <a:lnRef idx="1">
+              <a:schemeClr val="accent1"/>
+            </a:lnRef>
+            <a:fillRef idx="0">
+              <a:schemeClr val="accent1"/>
+            </a:fillRef>
+            <a:effectRef idx="0">
+              <a:schemeClr val="accent1"/>
+            </a:effectRef>
+            <a:fontRef idx="minor">
+              <a:schemeClr val="tx1"/>
+            </a:fontRef>
+          </p:style>
+        </p:cxnSp>
+        <p:cxnSp>
+          <p:nvCxnSpPr>
+            <p:cNvPr id="241" name="Connecteur droit 240"/>
+            <p:cNvCxnSpPr/>
+            <p:nvPr/>
+          </p:nvCxnSpPr>
+          <p:spPr>
+            <a:xfrm flipH="1">
+              <a:off x="2462400" y="2358000"/>
+              <a:ext cx="72000" cy="180000"/>
+            </a:xfrm>
+            <a:prstGeom prst="line">
+              <a:avLst/>
+            </a:prstGeom>
+            <a:ln>
+              <a:solidFill>
+                <a:schemeClr val="tx1"/>
+              </a:solidFill>
+            </a:ln>
+          </p:spPr>
+          <p:style>
+            <a:lnRef idx="1">
+              <a:schemeClr val="accent1"/>
+            </a:lnRef>
+            <a:fillRef idx="0">
+              <a:schemeClr val="accent1"/>
+            </a:fillRef>
+            <a:effectRef idx="0">
+              <a:schemeClr val="accent1"/>
+            </a:effectRef>
+            <a:fontRef idx="minor">
+              <a:schemeClr val="tx1"/>
+            </a:fontRef>
+          </p:style>
+        </p:cxnSp>
       </p:grpSp>
     </p:spTree>
     <p:extLst>

</xml_diff>